<commit_message>
Updated slides for the ActivityAccess and Intent activities to include a link to the website
</commit_message>
<xml_diff>
--- a/Vulnerabilities/ActivitiesAccess/ActivitiesAccess.pptx
+++ b/Vulnerabilities/ActivitiesAccess/ActivitiesAccess.pptx
@@ -111,6 +111,11 @@
       </a:defRPr>
     </a:lvl9pPr>
   </p:defaultTextStyle>
+  <p:extLst>
+    <p:ext uri="{EFAFB233-063F-42B5-8137-9DF3F51BA10A}">
+      <p15:sldGuideLst xmlns:p15="http://schemas.microsoft.com/office/powerpoint/2012/main"/>
+    </p:ext>
+  </p:extLst>
 </p:presentation>
 </file>
 
@@ -247,7 +252,7 @@
           <a:p>
             <a:fld id="{D1C5A854-3A0C-43B7-AE6D-AB817FE73E17}" type="datetimeFigureOut">
               <a:rPr lang="en-US" smtClean="0"/>
-              <a:t>4/13/2017</a:t>
+              <a:t>4/16/2017</a:t>
             </a:fld>
             <a:endParaRPr lang="en-US"/>
           </a:p>
@@ -415,7 +420,7 @@
           <a:p>
             <a:fld id="{D1C5A854-3A0C-43B7-AE6D-AB817FE73E17}" type="datetimeFigureOut">
               <a:rPr lang="en-US" smtClean="0"/>
-              <a:t>4/13/2017</a:t>
+              <a:t>4/16/2017</a:t>
             </a:fld>
             <a:endParaRPr lang="en-US"/>
           </a:p>
@@ -593,7 +598,7 @@
           <a:p>
             <a:fld id="{D1C5A854-3A0C-43B7-AE6D-AB817FE73E17}" type="datetimeFigureOut">
               <a:rPr lang="en-US" smtClean="0"/>
-              <a:t>4/13/2017</a:t>
+              <a:t>4/16/2017</a:t>
             </a:fld>
             <a:endParaRPr lang="en-US"/>
           </a:p>
@@ -856,6 +861,50 @@
           </a:p>
         </p:txBody>
       </p:sp>
+      <p:sp>
+        <p:nvSpPr>
+          <p:cNvPr id="4" name="Rectangle 3"/>
+          <p:cNvSpPr/>
+          <p:nvPr userDrawn="1"/>
+        </p:nvSpPr>
+        <p:spPr>
+          <a:xfrm>
+            <a:off x="9015105" y="26571"/>
+            <a:ext cx="3176895" cy="338554"/>
+          </a:xfrm>
+          <a:prstGeom prst="rect">
+            <a:avLst/>
+          </a:prstGeom>
+        </p:spPr>
+        <p:txBody>
+          <a:bodyPr wrap="none">
+            <a:spAutoFit/>
+          </a:bodyPr>
+          <a:lstStyle/>
+          <a:p>
+            <a:r>
+              <a:rPr lang="en-US" sz="1600" b="0" i="0" dirty="0">
+                <a:solidFill>
+                  <a:schemeClr val="bg2">
+                    <a:lumMod val="75000"/>
+                  </a:schemeClr>
+                </a:solidFill>
+                <a:latin typeface="Cambria" panose="02040503050406030204" pitchFamily="18" charset="0"/>
+                <a:hlinkClick r:id="rId4"/>
+              </a:rPr>
+              <a:t>www.Teachingmobilesecurity.com</a:t>
+            </a:r>
+            <a:endParaRPr lang="en-US" sz="1600" b="0" i="0" dirty="0">
+              <a:solidFill>
+                <a:schemeClr val="bg2">
+                  <a:lumMod val="75000"/>
+                </a:schemeClr>
+              </a:solidFill>
+              <a:latin typeface="Cambria" panose="02040503050406030204" pitchFamily="18" charset="0"/>
+            </a:endParaRPr>
+          </a:p>
+        </p:txBody>
+      </p:sp>
     </p:spTree>
     <p:extLst>
       <p:ext uri="{BB962C8B-B14F-4D97-AF65-F5344CB8AC3E}">
@@ -1053,7 +1102,7 @@
           <a:p>
             <a:fld id="{D1C5A854-3A0C-43B7-AE6D-AB817FE73E17}" type="datetimeFigureOut">
               <a:rPr lang="en-US" smtClean="0"/>
-              <a:t>4/13/2017</a:t>
+              <a:t>4/16/2017</a:t>
             </a:fld>
             <a:endParaRPr lang="en-US"/>
           </a:p>
@@ -1282,7 +1331,7 @@
           <a:p>
             <a:fld id="{D1C5A854-3A0C-43B7-AE6D-AB817FE73E17}" type="datetimeFigureOut">
               <a:rPr lang="en-US" smtClean="0"/>
-              <a:t>4/13/2017</a:t>
+              <a:t>4/16/2017</a:t>
             </a:fld>
             <a:endParaRPr lang="en-US"/>
           </a:p>
@@ -1646,7 +1695,7 @@
           <a:p>
             <a:fld id="{D1C5A854-3A0C-43B7-AE6D-AB817FE73E17}" type="datetimeFigureOut">
               <a:rPr lang="en-US" smtClean="0"/>
-              <a:t>4/13/2017</a:t>
+              <a:t>4/16/2017</a:t>
             </a:fld>
             <a:endParaRPr lang="en-US"/>
           </a:p>
@@ -1763,7 +1812,7 @@
           <a:p>
             <a:fld id="{D1C5A854-3A0C-43B7-AE6D-AB817FE73E17}" type="datetimeFigureOut">
               <a:rPr lang="en-US" smtClean="0"/>
-              <a:t>4/13/2017</a:t>
+              <a:t>4/16/2017</a:t>
             </a:fld>
             <a:endParaRPr lang="en-US"/>
           </a:p>
@@ -1858,7 +1907,7 @@
           <a:p>
             <a:fld id="{D1C5A854-3A0C-43B7-AE6D-AB817FE73E17}" type="datetimeFigureOut">
               <a:rPr lang="en-US" smtClean="0"/>
-              <a:t>4/13/2017</a:t>
+              <a:t>4/16/2017</a:t>
             </a:fld>
             <a:endParaRPr lang="en-US"/>
           </a:p>
@@ -2133,7 +2182,7 @@
           <a:p>
             <a:fld id="{D1C5A854-3A0C-43B7-AE6D-AB817FE73E17}" type="datetimeFigureOut">
               <a:rPr lang="en-US" smtClean="0"/>
-              <a:t>4/13/2017</a:t>
+              <a:t>4/16/2017</a:t>
             </a:fld>
             <a:endParaRPr lang="en-US"/>
           </a:p>
@@ -2385,7 +2434,7 @@
           <a:p>
             <a:fld id="{D1C5A854-3A0C-43B7-AE6D-AB817FE73E17}" type="datetimeFigureOut">
               <a:rPr lang="en-US" smtClean="0"/>
-              <a:t>4/13/2017</a:t>
+              <a:t>4/16/2017</a:t>
             </a:fld>
             <a:endParaRPr lang="en-US"/>
           </a:p>
@@ -2596,7 +2645,7 @@
           <a:p>
             <a:fld id="{D1C5A854-3A0C-43B7-AE6D-AB817FE73E17}" type="datetimeFigureOut">
               <a:rPr lang="en-US" smtClean="0"/>
-              <a:t>4/13/2017</a:t>
+              <a:t>4/16/2017</a:t>
             </a:fld>
             <a:endParaRPr lang="en-US"/>
           </a:p>

</xml_diff>